<commit_message>
add code style to prelab lecture
</commit_message>
<xml_diff>
--- a/proposal-prelab.pptx
+++ b/proposal-prelab.pptx
@@ -5,10 +5,10 @@
     <p:sldMasterId id="2147483648" r:id="rId1"/>
   </p:sldMasterIdLst>
   <p:notesMasterIdLst>
-    <p:notesMasterId r:id="rId10"/>
+    <p:notesMasterId r:id="rId11"/>
   </p:notesMasterIdLst>
   <p:handoutMasterIdLst>
-    <p:handoutMasterId r:id="rId11"/>
+    <p:handoutMasterId r:id="rId12"/>
   </p:handoutMasterIdLst>
   <p:sldIdLst>
     <p:sldId id="956" r:id="rId2"/>
@@ -16,14 +16,15 @@
     <p:sldId id="1309" r:id="rId4"/>
     <p:sldId id="1310" r:id="rId5"/>
     <p:sldId id="1312" r:id="rId6"/>
-    <p:sldId id="1311" r:id="rId7"/>
-    <p:sldId id="1313" r:id="rId8"/>
-    <p:sldId id="1314" r:id="rId9"/>
+    <p:sldId id="1315" r:id="rId7"/>
+    <p:sldId id="1311" r:id="rId8"/>
+    <p:sldId id="1313" r:id="rId9"/>
+    <p:sldId id="1314" r:id="rId10"/>
   </p:sldIdLst>
   <p:sldSz cx="9144000" cy="6858000" type="screen4x3"/>
   <p:notesSz cx="6858000" cy="9144000"/>
   <p:custDataLst>
-    <p:tags r:id="rId12"/>
+    <p:tags r:id="rId13"/>
   </p:custDataLst>
   <p:defaultTextStyle>
     <a:defPPr>
@@ -1379,6 +1380,85 @@
           <a:lstStyle/>
           <a:p>
             <a:r>
+              <a:rPr lang="es-ES" altLang="zh-CN" dirty="0">
+                <a:hlinkClick r:id="rId3"/>
+              </a:rPr>
+              <a:t>15-213/15-513 </a:t>
+            </a:r>
+            <a:r>
+              <a:rPr lang="zh-CN" altLang="es-ES" dirty="0">
+                <a:hlinkClick r:id="rId3"/>
+              </a:rPr>
+              <a:t>计算机系统简介：代码样式 </a:t>
+            </a:r>
+            <a:r>
+              <a:rPr lang="es-ES" altLang="zh-CN" dirty="0">
+                <a:hlinkClick r:id="rId3"/>
+              </a:rPr>
+              <a:t>(cmu.edu)</a:t>
+            </a:r>
+            <a:endParaRPr lang="en-GB" dirty="0"/>
+          </a:p>
+        </p:txBody>
+      </p:sp>
+    </p:spTree>
+    <p:extLst>
+      <p:ext uri="{BB962C8B-B14F-4D97-AF65-F5344CB8AC3E}">
+        <p14:creationId xmlns:p14="http://schemas.microsoft.com/office/powerpoint/2010/main" val="3074342673"/>
+      </p:ext>
+    </p:extLst>
+  </p:cSld>
+  <p:clrMapOvr>
+    <a:masterClrMapping/>
+  </p:clrMapOvr>
+</p:notes>
+</file>
+
+<file path=ppt/notesSlides/notesSlide4.xml><?xml version="1.0" encoding="utf-8"?>
+<p:notes xmlns:a="http://schemas.openxmlformats.org/drawingml/2006/main" xmlns:r="http://schemas.openxmlformats.org/officeDocument/2006/relationships" xmlns:p="http://schemas.openxmlformats.org/presentationml/2006/main">
+  <p:cSld>
+    <p:spTree>
+      <p:nvGrpSpPr>
+        <p:cNvPr id="1" name=""/>
+        <p:cNvGrpSpPr/>
+        <p:nvPr/>
+      </p:nvGrpSpPr>
+      <p:grpSpPr>
+        <a:xfrm>
+          <a:off x="0" y="0"/>
+          <a:ext cx="0" cy="0"/>
+          <a:chOff x="0" y="0"/>
+          <a:chExt cx="0" cy="0"/>
+        </a:xfrm>
+      </p:grpSpPr>
+      <p:sp>
+        <p:nvSpPr>
+          <p:cNvPr id="2" name="幻灯片图像占位符 1"/>
+          <p:cNvSpPr>
+            <a:spLocks noGrp="1" noRot="1" noChangeAspect="1"/>
+          </p:cNvSpPr>
+          <p:nvPr>
+            <p:ph type="sldImg"/>
+          </p:nvPr>
+        </p:nvSpPr>
+        <p:spPr/>
+      </p:sp>
+      <p:sp>
+        <p:nvSpPr>
+          <p:cNvPr id="3" name="备注占位符 2"/>
+          <p:cNvSpPr>
+            <a:spLocks noGrp="1"/>
+          </p:cNvSpPr>
+          <p:nvPr>
+            <p:ph type="body" idx="1"/>
+          </p:nvPr>
+        </p:nvSpPr>
+        <p:spPr/>
+        <p:txBody>
+          <a:bodyPr/>
+          <a:lstStyle/>
+          <a:p>
+            <a:r>
               <a:rPr lang="zh-CN" altLang="es-ES" dirty="0"/>
               <a:t>接着我们之前讨论的学习梯度比较大的问题</a:t>
             </a:r>
@@ -1399,7 +1479,7 @@
 </p:notes>
 </file>
 
-<file path=ppt/notesSlides/notesSlide4.xml><?xml version="1.0" encoding="utf-8"?>
+<file path=ppt/notesSlides/notesSlide5.xml><?xml version="1.0" encoding="utf-8"?>
 <p:notes xmlns:a="http://schemas.openxmlformats.org/drawingml/2006/main" xmlns:r="http://schemas.openxmlformats.org/officeDocument/2006/relationships" xmlns:p="http://schemas.openxmlformats.org/presentationml/2006/main">
   <p:cSld>
     <p:spTree>
@@ -6131,14 +6211,23 @@
               <a:rPr lang="zh-CN" altLang="es-ES" dirty="0">
                 <a:ea typeface="宋体" panose="02010600030101010101" pitchFamily="2" charset="-122"/>
               </a:rPr>
-              <a:t>思想建设和心理建设</a:t>
-            </a:r>
-            <a:r>
-              <a:rPr lang="es-ES" altLang="zh-CN" dirty="0">
+              <a:t>开始</a:t>
+            </a:r>
+            <a:r>
+              <a:rPr lang="es-ES" altLang="zh-CN" dirty="0" err="1">
                 <a:ea typeface="宋体" panose="02010600030101010101" pitchFamily="2" charset="-122"/>
               </a:rPr>
-              <a:t> </a:t>
-            </a:r>
+              <a:t>lab</a:t>
+            </a:r>
+            <a:r>
+              <a:rPr lang="zh-CN" altLang="es-ES" dirty="0">
+                <a:ea typeface="宋体" panose="02010600030101010101" pitchFamily="2" charset="-122"/>
+              </a:rPr>
+              <a:t>前的准备</a:t>
+            </a:r>
+            <a:endParaRPr lang="es-ES" altLang="zh-CN" dirty="0">
+              <a:ea typeface="宋体" panose="02010600030101010101" pitchFamily="2" charset="-122"/>
+            </a:endParaRPr>
           </a:p>
           <a:p>
             <a:r>
@@ -6173,6 +6262,18 @@
                 <a:ea typeface="宋体" panose="02010600030101010101" pitchFamily="2" charset="-122"/>
               </a:rPr>
               <a:t>学会解决问题</a:t>
+            </a:r>
+            <a:endParaRPr lang="es-ES" altLang="zh-CN" dirty="0">
+              <a:ea typeface="宋体" panose="02010600030101010101" pitchFamily="2" charset="-122"/>
+            </a:endParaRPr>
+          </a:p>
+          <a:p>
+            <a:pPr lvl="1"/>
+            <a:r>
+              <a:rPr lang="zh-CN" altLang="es-ES" dirty="0">
+                <a:ea typeface="宋体" panose="02010600030101010101" pitchFamily="2" charset="-122"/>
+              </a:rPr>
+              <a:t>代码风格规范</a:t>
             </a:r>
             <a:endParaRPr lang="es-ES" altLang="zh-CN" dirty="0">
               <a:ea typeface="宋体" panose="02010600030101010101" pitchFamily="2" charset="-122"/>
@@ -6254,7 +6355,19 @@
               <a:rPr lang="zh-CN" altLang="es-ES" dirty="0">
                 <a:ea typeface="宋体" panose="02010600030101010101" pitchFamily="2" charset="-122"/>
               </a:rPr>
-              <a:t>心理建设和思想建设</a:t>
+              <a:t>开始</a:t>
+            </a:r>
+            <a:r>
+              <a:rPr lang="es-ES" altLang="zh-CN" dirty="0" err="1">
+                <a:ea typeface="宋体" panose="02010600030101010101" pitchFamily="2" charset="-122"/>
+              </a:rPr>
+              <a:t>lab</a:t>
+            </a:r>
+            <a:r>
+              <a:rPr lang="zh-CN" altLang="es-ES" dirty="0">
+                <a:ea typeface="宋体" panose="02010600030101010101" pitchFamily="2" charset="-122"/>
+              </a:rPr>
+              <a:t>前的准备</a:t>
             </a:r>
             <a:endParaRPr lang="en-GB" dirty="0"/>
           </a:p>
@@ -6541,12 +6654,6 @@
           </a:p>
           <a:p>
             <a:r>
-              <a:rPr lang="es-ES" altLang="zh-CN" dirty="0"/>
-              <a:t>LLM </a:t>
-            </a:r>
-          </a:p>
-          <a:p>
-            <a:r>
               <a:rPr lang="zh-CN" altLang="es-ES" dirty="0"/>
               <a:t>学会去查英文资料</a:t>
             </a:r>
@@ -6636,7 +6743,7 @@
           <p:cNvPr id="2" name="标题 1">
             <a:extLst>
               <a:ext uri="{FF2B5EF4-FFF2-40B4-BE49-F238E27FC236}">
-                <a16:creationId xmlns:a16="http://schemas.microsoft.com/office/drawing/2014/main" id="{6D96A18A-F40C-467C-9DD2-28CE1D2D45E3}"/>
+                <a16:creationId xmlns:a16="http://schemas.microsoft.com/office/drawing/2014/main" id="{0923F52E-2F4A-4407-853D-5B33B9F98913}"/>
               </a:ext>
             </a:extLst>
           </p:cNvPr>
@@ -6654,7 +6761,7 @@
           <a:p>
             <a:r>
               <a:rPr lang="zh-CN" altLang="es-ES" dirty="0"/>
-              <a:t>学术红线</a:t>
+              <a:t>代码风格规范</a:t>
             </a:r>
             <a:endParaRPr lang="en-GB" dirty="0"/>
           </a:p>
@@ -6665,7 +6772,7 @@
           <p:cNvPr id="3" name="内容占位符 2">
             <a:extLst>
               <a:ext uri="{FF2B5EF4-FFF2-40B4-BE49-F238E27FC236}">
-                <a16:creationId xmlns:a16="http://schemas.microsoft.com/office/drawing/2014/main" id="{EC81BB42-ADBE-40E4-82B5-2270CFE03E54}"/>
+                <a16:creationId xmlns:a16="http://schemas.microsoft.com/office/drawing/2014/main" id="{B0E97C52-D47D-42C1-B406-432000A5D134}"/>
               </a:ext>
             </a:extLst>
           </p:cNvPr>
@@ -6683,44 +6790,37 @@
           <a:p>
             <a:r>
               <a:rPr lang="zh-CN" altLang="es-ES" dirty="0"/>
-              <a:t>被禁止的</a:t>
+              <a:t>变量命名规则</a:t>
             </a:r>
             <a:endParaRPr lang="es-ES" altLang="zh-CN" dirty="0"/>
           </a:p>
           <a:p>
-            <a:pPr lvl="1"/>
             <a:r>
               <a:rPr lang="zh-CN" altLang="es-ES" dirty="0"/>
-              <a:t> 互相抄袭</a:t>
+              <a:t>注释</a:t>
             </a:r>
             <a:endParaRPr lang="es-ES" altLang="zh-CN" dirty="0"/>
           </a:p>
           <a:p>
-            <a:pPr lvl="1"/>
             <a:r>
               <a:rPr lang="zh-CN" altLang="es-ES" dirty="0"/>
-              <a:t> 剽窃</a:t>
+              <a:t>模块化</a:t>
             </a:r>
             <a:endParaRPr lang="es-ES" altLang="zh-CN" dirty="0"/>
           </a:p>
           <a:p>
-            <a:pPr lvl="1"/>
-            <a:r>
-              <a:rPr lang="es-ES" altLang="zh-CN" dirty="0"/>
-              <a:t> </a:t>
-            </a:r>
             <a:r>
               <a:rPr lang="zh-CN" altLang="es-ES" dirty="0"/>
-              <a:t>未授权的合作</a:t>
-            </a:r>
-            <a:endParaRPr lang="es-ES" altLang="zh-CN" dirty="0"/>
+              <a:t>版本管理</a:t>
+            </a:r>
+            <a:endParaRPr lang="en-GB" dirty="0"/>
           </a:p>
         </p:txBody>
       </p:sp>
     </p:spTree>
     <p:extLst>
       <p:ext uri="{BB962C8B-B14F-4D97-AF65-F5344CB8AC3E}">
-        <p14:creationId xmlns:p14="http://schemas.microsoft.com/office/powerpoint/2010/main" val="2107889700"/>
+        <p14:creationId xmlns:p14="http://schemas.microsoft.com/office/powerpoint/2010/main" val="517361328"/>
       </p:ext>
     </p:extLst>
   </p:cSld>
@@ -6752,6 +6852,122 @@
           <p:cNvPr id="2" name="标题 1">
             <a:extLst>
               <a:ext uri="{FF2B5EF4-FFF2-40B4-BE49-F238E27FC236}">
+                <a16:creationId xmlns:a16="http://schemas.microsoft.com/office/drawing/2014/main" id="{6D96A18A-F40C-467C-9DD2-28CE1D2D45E3}"/>
+              </a:ext>
+            </a:extLst>
+          </p:cNvPr>
+          <p:cNvSpPr>
+            <a:spLocks noGrp="1"/>
+          </p:cNvSpPr>
+          <p:nvPr>
+            <p:ph type="title"/>
+          </p:nvPr>
+        </p:nvSpPr>
+        <p:spPr/>
+        <p:txBody>
+          <a:bodyPr/>
+          <a:lstStyle/>
+          <a:p>
+            <a:r>
+              <a:rPr lang="zh-CN" altLang="es-ES" dirty="0"/>
+              <a:t>学术红线</a:t>
+            </a:r>
+            <a:endParaRPr lang="en-GB" dirty="0"/>
+          </a:p>
+        </p:txBody>
+      </p:sp>
+      <p:sp>
+        <p:nvSpPr>
+          <p:cNvPr id="3" name="内容占位符 2">
+            <a:extLst>
+              <a:ext uri="{FF2B5EF4-FFF2-40B4-BE49-F238E27FC236}">
+                <a16:creationId xmlns:a16="http://schemas.microsoft.com/office/drawing/2014/main" id="{EC81BB42-ADBE-40E4-82B5-2270CFE03E54}"/>
+              </a:ext>
+            </a:extLst>
+          </p:cNvPr>
+          <p:cNvSpPr>
+            <a:spLocks noGrp="1"/>
+          </p:cNvSpPr>
+          <p:nvPr>
+            <p:ph idx="1"/>
+          </p:nvPr>
+        </p:nvSpPr>
+        <p:spPr/>
+        <p:txBody>
+          <a:bodyPr/>
+          <a:lstStyle/>
+          <a:p>
+            <a:r>
+              <a:rPr lang="zh-CN" altLang="es-ES" dirty="0"/>
+              <a:t>被禁止的</a:t>
+            </a:r>
+            <a:endParaRPr lang="es-ES" altLang="zh-CN" dirty="0"/>
+          </a:p>
+          <a:p>
+            <a:pPr lvl="1"/>
+            <a:r>
+              <a:rPr lang="zh-CN" altLang="es-ES" dirty="0"/>
+              <a:t> 互相抄袭</a:t>
+            </a:r>
+            <a:endParaRPr lang="es-ES" altLang="zh-CN" dirty="0"/>
+          </a:p>
+          <a:p>
+            <a:pPr lvl="1"/>
+            <a:r>
+              <a:rPr lang="zh-CN" altLang="es-ES" dirty="0"/>
+              <a:t> 剽窃</a:t>
+            </a:r>
+            <a:endParaRPr lang="es-ES" altLang="zh-CN" dirty="0"/>
+          </a:p>
+          <a:p>
+            <a:pPr lvl="1"/>
+            <a:r>
+              <a:rPr lang="es-ES" altLang="zh-CN" dirty="0"/>
+              <a:t> </a:t>
+            </a:r>
+            <a:r>
+              <a:rPr lang="zh-CN" altLang="es-ES" dirty="0"/>
+              <a:t>未授权的合作</a:t>
+            </a:r>
+            <a:endParaRPr lang="es-ES" altLang="zh-CN" dirty="0"/>
+          </a:p>
+        </p:txBody>
+      </p:sp>
+    </p:spTree>
+    <p:extLst>
+      <p:ext uri="{BB962C8B-B14F-4D97-AF65-F5344CB8AC3E}">
+        <p14:creationId xmlns:p14="http://schemas.microsoft.com/office/powerpoint/2010/main" val="2107889700"/>
+      </p:ext>
+    </p:extLst>
+  </p:cSld>
+  <p:clrMapOvr>
+    <a:masterClrMapping/>
+  </p:clrMapOvr>
+</p:sld>
+</file>
+
+<file path=ppt/slides/slide8.xml><?xml version="1.0" encoding="utf-8"?>
+<p:sld xmlns:a="http://schemas.openxmlformats.org/drawingml/2006/main" xmlns:r="http://schemas.openxmlformats.org/officeDocument/2006/relationships" xmlns:p="http://schemas.openxmlformats.org/presentationml/2006/main">
+  <p:cSld>
+    <p:spTree>
+      <p:nvGrpSpPr>
+        <p:cNvPr id="1" name=""/>
+        <p:cNvGrpSpPr/>
+        <p:nvPr/>
+      </p:nvGrpSpPr>
+      <p:grpSpPr>
+        <a:xfrm>
+          <a:off x="0" y="0"/>
+          <a:ext cx="0" cy="0"/>
+          <a:chOff x="0" y="0"/>
+          <a:chExt cx="0" cy="0"/>
+        </a:xfrm>
+      </p:grpSpPr>
+      <p:sp>
+        <p:nvSpPr>
+          <p:cNvPr id="2" name="标题 1">
+            <a:extLst>
+              <a:ext uri="{FF2B5EF4-FFF2-40B4-BE49-F238E27FC236}">
                 <a16:creationId xmlns:a16="http://schemas.microsoft.com/office/drawing/2014/main" id="{98BB4C9A-FB15-4E80-AA68-3B9F7DD9A62C}"/>
               </a:ext>
             </a:extLst>
@@ -6869,7 +7085,7 @@
 </p:sld>
 </file>
 
-<file path=ppt/slides/slide8.xml><?xml version="1.0" encoding="utf-8"?>
+<file path=ppt/slides/slide9.xml><?xml version="1.0" encoding="utf-8"?>
 <p:sld xmlns:a="http://schemas.openxmlformats.org/drawingml/2006/main" xmlns:r="http://schemas.openxmlformats.org/officeDocument/2006/relationships" xmlns:p="http://schemas.openxmlformats.org/presentationml/2006/main">
   <p:cSld>
     <p:spTree>

</xml_diff>